<commit_message>
map words added, ppt added some content
</commit_message>
<xml_diff>
--- a/presentation.pptx
+++ b/presentation.pptx
@@ -15,6 +15,8 @@
     <p:sldId id="264" r:id="rId9"/>
     <p:sldId id="266" r:id="rId10"/>
     <p:sldId id="265" r:id="rId11"/>
+    <p:sldId id="268" r:id="rId12"/>
+    <p:sldId id="267" r:id="rId13"/>
   </p:sldIdLst>
   <p:sldSz cx="12192000" cy="6858000"/>
   <p:notesSz cx="6858000" cy="9144000"/>
@@ -113,6 +115,11 @@
       </a:defRPr>
     </a:lvl9pPr>
   </p:defaultTextStyle>
+  <p:extLst>
+    <p:ext uri="{EFAFB233-063F-42B5-8137-9DF3F51BA10A}">
+      <p15:sldGuideLst xmlns:p15="http://schemas.microsoft.com/office/powerpoint/2012/main"/>
+    </p:ext>
+  </p:extLst>
 </p:presentation>
 </file>
 
@@ -279,7 +286,7 @@
             <a:fld id="{11A6662E-FAF4-44BC-88B5-85A7CBFB6D30}" type="datetime1">
               <a:rPr lang="en-US" smtClean="0"/>
               <a:pPr/>
-              <a:t>3/7/24</a:t>
+              <a:t>3/8/2024</a:t>
             </a:fld>
             <a:endParaRPr lang="en-US" dirty="0"/>
           </a:p>
@@ -506,7 +513,7 @@
           <a:p>
             <a:fld id="{4C559632-1575-4E14-B53B-3DC3D5ED3947}" type="datetime1">
               <a:rPr lang="en-US" smtClean="0"/>
-              <a:t>3/7/24</a:t>
+              <a:t>3/8/2024</a:t>
             </a:fld>
             <a:endParaRPr lang="en-US"/>
           </a:p>
@@ -714,7 +721,7 @@
           <a:p>
             <a:fld id="{CC4A6868-2568-4CC9-B302-F37117B01A6E}" type="datetime1">
               <a:rPr lang="en-US" smtClean="0"/>
-              <a:t>3/7/24</a:t>
+              <a:t>3/8/2024</a:t>
             </a:fld>
             <a:endParaRPr lang="en-US"/>
           </a:p>
@@ -919,7 +926,7 @@
           <a:p>
             <a:fld id="{0055F08A-1E71-4B2B-BB49-E743F2903911}" type="datetime1">
               <a:rPr lang="en-US" smtClean="0"/>
-              <a:t>3/7/24</a:t>
+              <a:t>3/8/2024</a:t>
             </a:fld>
             <a:endParaRPr lang="en-US" dirty="0"/>
           </a:p>
@@ -1193,7 +1200,7 @@
           <a:p>
             <a:fld id="{15417D9E-721A-44BB-8863-9873FE64DA75}" type="datetime1">
               <a:rPr lang="en-US" smtClean="0"/>
-              <a:t>3/7/24</a:t>
+              <a:t>3/8/2024</a:t>
             </a:fld>
             <a:endParaRPr lang="en-US"/>
           </a:p>
@@ -1466,7 +1473,7 @@
           <a:p>
             <a:fld id="{5F31DA2F-80B8-49CF-99FB-5ABCA53A607A}" type="datetime1">
               <a:rPr lang="en-US" smtClean="0"/>
-              <a:t>3/7/24</a:t>
+              <a:t>3/8/2024</a:t>
             </a:fld>
             <a:endParaRPr lang="en-US"/>
           </a:p>
@@ -1881,7 +1888,7 @@
           <a:p>
             <a:fld id="{28852172-E6C9-4B6C-929A-A9DE3837BBF1}" type="datetime1">
               <a:rPr lang="en-US" smtClean="0"/>
-              <a:t>3/7/24</a:t>
+              <a:t>3/8/2024</a:t>
             </a:fld>
             <a:endParaRPr lang="en-US"/>
           </a:p>
@@ -2033,7 +2040,7 @@
           <a:p>
             <a:fld id="{3AB41CFF-90C9-47B3-9DA1-F2BF8D839F7E}" type="datetime1">
               <a:rPr lang="en-US" smtClean="0"/>
-              <a:t>3/7/24</a:t>
+              <a:t>3/8/2024</a:t>
             </a:fld>
             <a:endParaRPr lang="en-US"/>
           </a:p>
@@ -2146,7 +2153,7 @@
           <a:p>
             <a:fld id="{F06048FA-06AB-4884-A69B-986B96E68A24}" type="datetime1">
               <a:rPr lang="en-US" smtClean="0"/>
-              <a:t>3/7/24</a:t>
+              <a:t>3/8/2024</a:t>
             </a:fld>
             <a:endParaRPr lang="en-US"/>
           </a:p>
@@ -2457,7 +2464,7 @@
           <a:p>
             <a:fld id="{50DB7ABA-0172-4F9C-889D-567164F66BCD}" type="datetime1">
               <a:rPr lang="en-US" smtClean="0"/>
-              <a:t>3/7/24</a:t>
+              <a:t>3/8/2024</a:t>
             </a:fld>
             <a:endParaRPr lang="en-US"/>
           </a:p>
@@ -2748,7 +2755,7 @@
           <a:p>
             <a:fld id="{78AC6A5B-8AE7-4A41-B5A7-9ADC6686DC18}" type="datetime1">
               <a:rPr lang="en-US" smtClean="0"/>
-              <a:t>3/7/24</a:t>
+              <a:t>3/8/2024</a:t>
             </a:fld>
             <a:endParaRPr lang="en-US"/>
           </a:p>
@@ -3066,7 +3073,7 @@
             <a:fld id="{57E0CF6C-748E-4B7A-BC8B-3011EF78ED13}" type="datetime1">
               <a:rPr lang="en-US" smtClean="0"/>
               <a:pPr/>
-              <a:t>3/7/24</a:t>
+              <a:t>3/8/2024</a:t>
             </a:fld>
             <a:endParaRPr lang="en-US" dirty="0"/>
           </a:p>
@@ -4126,43 +4133,273 @@
           <a:p>
             <a:r>
               <a:rPr lang="en-US" dirty="0"/>
-              <a:t>HTML</a:t>
-            </a:r>
-          </a:p>
-        </p:txBody>
-      </p:sp>
-      <p:sp>
-        <p:nvSpPr>
-          <p:cNvPr id="3" name="Content Placeholder 2">
-            <a:extLst>
-              <a:ext uri="{FF2B5EF4-FFF2-40B4-BE49-F238E27FC236}">
-                <a16:creationId xmlns:a16="http://schemas.microsoft.com/office/drawing/2014/main" id="{6692C1E4-77D4-940D-FE7D-A7E9D0A9F954}"/>
-              </a:ext>
-            </a:extLst>
-          </p:cNvPr>
-          <p:cNvSpPr>
-            <a:spLocks noGrp="1"/>
-          </p:cNvSpPr>
+              <a:t>Hospital</a:t>
+            </a:r>
+            <a:r>
+              <a:rPr lang="zh-CN" altLang="en-US" dirty="0"/>
+              <a:t> </a:t>
+            </a:r>
+            <a:r>
+              <a:rPr lang="en-US" altLang="zh-CN" dirty="0"/>
+              <a:t>Location</a:t>
+            </a:r>
+            <a:r>
+              <a:rPr lang="zh-CN" altLang="en-US" dirty="0"/>
+              <a:t> </a:t>
+            </a:r>
+            <a:r>
+              <a:rPr lang="en-US" altLang="zh-CN" dirty="0"/>
+              <a:t>and</a:t>
+            </a:r>
+            <a:r>
+              <a:rPr lang="zh-CN" altLang="en-US" dirty="0"/>
+              <a:t> </a:t>
+            </a:r>
+            <a:r>
+              <a:rPr lang="en-US" altLang="zh-CN" dirty="0"/>
+              <a:t>Bed</a:t>
+            </a:r>
+            <a:r>
+              <a:rPr lang="zh-CN" altLang="en-US" dirty="0"/>
+              <a:t> </a:t>
+            </a:r>
+            <a:r>
+              <a:rPr lang="en-US" altLang="zh-CN" dirty="0"/>
+              <a:t>data</a:t>
+            </a:r>
+            <a:endParaRPr lang="en-US" dirty="0"/>
+          </a:p>
+        </p:txBody>
+      </p:sp>
+      <p:pic>
+        <p:nvPicPr>
+          <p:cNvPr id="5" name="内容占位符 4">
+            <a:extLst>
+              <a:ext uri="{FF2B5EF4-FFF2-40B4-BE49-F238E27FC236}">
+                <a16:creationId xmlns:a16="http://schemas.microsoft.com/office/drawing/2014/main" id="{7BF06D61-1B1C-E8CA-EB20-0FC40C278832}"/>
+              </a:ext>
+            </a:extLst>
+          </p:cNvPr>
+          <p:cNvPicPr>
+            <a:picLocks noGrp="1" noChangeAspect="1"/>
+          </p:cNvPicPr>
           <p:nvPr>
             <p:ph idx="1"/>
           </p:nvPr>
-        </p:nvSpPr>
-        <p:spPr/>
-        <p:txBody>
-          <a:bodyPr/>
-          <a:lstStyle/>
-          <a:p>
-            <a:pPr marL="0" indent="0">
-              <a:buNone/>
-            </a:pPr>
-            <a:endParaRPr lang="en-US" dirty="0"/>
-          </a:p>
-        </p:txBody>
-      </p:sp>
+        </p:nvPicPr>
+        <p:blipFill>
+          <a:blip r:embed="rId2"/>
+          <a:stretch>
+            <a:fillRect/>
+          </a:stretch>
+        </p:blipFill>
+        <p:spPr>
+          <a:xfrm>
+            <a:off x="337490" y="1463447"/>
+            <a:ext cx="11274425" cy="2984406"/>
+          </a:xfrm>
+        </p:spPr>
+      </p:pic>
+      <p:pic>
+        <p:nvPicPr>
+          <p:cNvPr id="9" name="图片 8">
+            <a:extLst>
+              <a:ext uri="{FF2B5EF4-FFF2-40B4-BE49-F238E27FC236}">
+                <a16:creationId xmlns:a16="http://schemas.microsoft.com/office/drawing/2014/main" id="{65302510-4595-B790-065F-D0DD2E950719}"/>
+              </a:ext>
+            </a:extLst>
+          </p:cNvPr>
+          <p:cNvPicPr>
+            <a:picLocks noChangeAspect="1"/>
+          </p:cNvPicPr>
+          <p:nvPr/>
+        </p:nvPicPr>
+        <p:blipFill>
+          <a:blip r:embed="rId3"/>
+          <a:stretch>
+            <a:fillRect/>
+          </a:stretch>
+        </p:blipFill>
+        <p:spPr>
+          <a:xfrm>
+            <a:off x="269032" y="4774696"/>
+            <a:ext cx="11653935" cy="1541688"/>
+          </a:xfrm>
+          <a:prstGeom prst="rect">
+            <a:avLst/>
+          </a:prstGeom>
+        </p:spPr>
+      </p:pic>
     </p:spTree>
     <p:extLst>
       <p:ext uri="{BB962C8B-B14F-4D97-AF65-F5344CB8AC3E}">
         <p14:creationId xmlns:p14="http://schemas.microsoft.com/office/powerpoint/2010/main" val="2258069286"/>
+      </p:ext>
+    </p:extLst>
+  </p:cSld>
+  <p:clrMapOvr>
+    <a:masterClrMapping/>
+  </p:clrMapOvr>
+</p:sld>
+</file>
+
+<file path=ppt/slides/slide11.xml><?xml version="1.0" encoding="utf-8"?>
+<p:sld xmlns:a="http://schemas.openxmlformats.org/drawingml/2006/main" xmlns:r="http://schemas.openxmlformats.org/officeDocument/2006/relationships" xmlns:p="http://schemas.openxmlformats.org/presentationml/2006/main">
+  <p:cSld>
+    <p:spTree>
+      <p:nvGrpSpPr>
+        <p:cNvPr id="1" name=""/>
+        <p:cNvGrpSpPr/>
+        <p:nvPr/>
+      </p:nvGrpSpPr>
+      <p:grpSpPr>
+        <a:xfrm>
+          <a:off x="0" y="0"/>
+          <a:ext cx="0" cy="0"/>
+          <a:chOff x="0" y="0"/>
+          <a:chExt cx="0" cy="0"/>
+        </a:xfrm>
+      </p:grpSpPr>
+      <p:sp>
+        <p:nvSpPr>
+          <p:cNvPr id="2" name="标题 1">
+            <a:extLst>
+              <a:ext uri="{FF2B5EF4-FFF2-40B4-BE49-F238E27FC236}">
+                <a16:creationId xmlns:a16="http://schemas.microsoft.com/office/drawing/2014/main" id="{D706D3DB-8648-ED56-E0FB-47BA93EEEA0F}"/>
+              </a:ext>
+            </a:extLst>
+          </p:cNvPr>
+          <p:cNvSpPr>
+            <a:spLocks noGrp="1"/>
+          </p:cNvSpPr>
+          <p:nvPr>
+            <p:ph type="title"/>
+          </p:nvPr>
+        </p:nvSpPr>
+        <p:spPr/>
+        <p:txBody>
+          <a:bodyPr/>
+          <a:lstStyle/>
+          <a:p>
+            <a:r>
+              <a:rPr lang="en-US" altLang="zh-CN" dirty="0"/>
+              <a:t>Our </a:t>
+            </a:r>
+            <a:r>
+              <a:rPr lang="en-US" altLang="zh-CN" dirty="0" err="1"/>
+              <a:t>GeoNarrative</a:t>
+            </a:r>
+            <a:endParaRPr lang="zh-CN" altLang="en-US" dirty="0"/>
+          </a:p>
+        </p:txBody>
+      </p:sp>
+      <p:sp>
+        <p:nvSpPr>
+          <p:cNvPr id="3" name="内容占位符 2">
+            <a:extLst>
+              <a:ext uri="{FF2B5EF4-FFF2-40B4-BE49-F238E27FC236}">
+                <a16:creationId xmlns:a16="http://schemas.microsoft.com/office/drawing/2014/main" id="{5D8774FB-EF24-579F-0727-4DCB496E6315}"/>
+              </a:ext>
+            </a:extLst>
+          </p:cNvPr>
+          <p:cNvSpPr>
+            <a:spLocks noGrp="1"/>
+          </p:cNvSpPr>
+          <p:nvPr>
+            <p:ph idx="1"/>
+          </p:nvPr>
+        </p:nvSpPr>
+        <p:spPr/>
+        <p:txBody>
+          <a:bodyPr/>
+          <a:lstStyle/>
+          <a:p>
+            <a:r>
+              <a:rPr lang="en-US" altLang="zh-CN" dirty="0">
+                <a:hlinkClick r:id="rId2"/>
+              </a:rPr>
+              <a:t>https://chaerihong.github.io/geog458_aa1_finalproject/</a:t>
+            </a:r>
+            <a:endParaRPr lang="en-US" altLang="zh-CN" dirty="0"/>
+          </a:p>
+          <a:p>
+            <a:endParaRPr lang="zh-CN" altLang="en-US" dirty="0"/>
+          </a:p>
+        </p:txBody>
+      </p:sp>
+    </p:spTree>
+    <p:extLst>
+      <p:ext uri="{BB962C8B-B14F-4D97-AF65-F5344CB8AC3E}">
+        <p14:creationId xmlns:p14="http://schemas.microsoft.com/office/powerpoint/2010/main" val="1248534278"/>
+      </p:ext>
+    </p:extLst>
+  </p:cSld>
+  <p:clrMapOvr>
+    <a:masterClrMapping/>
+  </p:clrMapOvr>
+</p:sld>
+</file>
+
+<file path=ppt/slides/slide12.xml><?xml version="1.0" encoding="utf-8"?>
+<p:sld xmlns:a="http://schemas.openxmlformats.org/drawingml/2006/main" xmlns:r="http://schemas.openxmlformats.org/officeDocument/2006/relationships" xmlns:p="http://schemas.openxmlformats.org/presentationml/2006/main">
+  <p:cSld>
+    <p:spTree>
+      <p:nvGrpSpPr>
+        <p:cNvPr id="1" name=""/>
+        <p:cNvGrpSpPr/>
+        <p:nvPr/>
+      </p:nvGrpSpPr>
+      <p:grpSpPr>
+        <a:xfrm>
+          <a:off x="0" y="0"/>
+          <a:ext cx="0" cy="0"/>
+          <a:chOff x="0" y="0"/>
+          <a:chExt cx="0" cy="0"/>
+        </a:xfrm>
+      </p:grpSpPr>
+      <p:sp>
+        <p:nvSpPr>
+          <p:cNvPr id="2" name="标题 1">
+            <a:extLst>
+              <a:ext uri="{FF2B5EF4-FFF2-40B4-BE49-F238E27FC236}">
+                <a16:creationId xmlns:a16="http://schemas.microsoft.com/office/drawing/2014/main" id="{455CE0E4-ECDD-EE2A-F9B6-4B30C2C0CC82}"/>
+              </a:ext>
+            </a:extLst>
+          </p:cNvPr>
+          <p:cNvSpPr>
+            <a:spLocks noGrp="1"/>
+          </p:cNvSpPr>
+          <p:nvPr>
+            <p:ph type="title"/>
+          </p:nvPr>
+        </p:nvSpPr>
+        <p:spPr>
+          <a:xfrm>
+            <a:off x="3322247" y="2703862"/>
+            <a:ext cx="6932706" cy="1325563"/>
+          </a:xfrm>
+        </p:spPr>
+        <p:txBody>
+          <a:bodyPr>
+            <a:normAutofit fontScale="90000"/>
+          </a:bodyPr>
+          <a:lstStyle/>
+          <a:p>
+            <a:r>
+              <a:rPr lang="en-US" altLang="zh-CN" dirty="0"/>
+              <a:t>Thank you for listening</a:t>
+            </a:r>
+            <a:br>
+              <a:rPr lang="en-US" altLang="zh-CN" dirty="0"/>
+            </a:br>
+            <a:endParaRPr lang="zh-CN" altLang="en-US" dirty="0"/>
+          </a:p>
+        </p:txBody>
+      </p:sp>
+    </p:spTree>
+    <p:extLst>
+      <p:ext uri="{BB962C8B-B14F-4D97-AF65-F5344CB8AC3E}">
+        <p14:creationId xmlns:p14="http://schemas.microsoft.com/office/powerpoint/2010/main" val="1608102348"/>
       </p:ext>
     </p:extLst>
   </p:cSld>
@@ -5126,7 +5363,23 @@
             </a:pPr>
             <a:r>
               <a:rPr lang="en-US" dirty="0"/>
-              <a:t>The project aims to mobilize community members and inform government officials to advocate for better hospital accessibility in underserved areas, leveraging grassroots support to address healthcare disparities.</a:t>
+              <a:t>The project aims to mobilize </a:t>
+            </a:r>
+            <a:r>
+              <a:rPr lang="en-US" b="1" dirty="0"/>
+              <a:t>community members </a:t>
+            </a:r>
+            <a:r>
+              <a:rPr lang="en-US" dirty="0"/>
+              <a:t>and inform </a:t>
+            </a:r>
+            <a:r>
+              <a:rPr lang="en-US" b="1" dirty="0"/>
+              <a:t>government officials </a:t>
+            </a:r>
+            <a:r>
+              <a:rPr lang="en-US" dirty="0"/>
+              <a:t>to advocate for better hospital accessibility in underserved areas, leveraging grassroots support to address potential healthcare disparities. </a:t>
             </a:r>
           </a:p>
         </p:txBody>
@@ -5398,27 +5651,25 @@
               <a:buChar char="•"/>
             </a:pPr>
             <a:r>
+              <a:rPr lang="en-US" sz="1200" dirty="0"/>
+              <a:t>Census Geographic Files</a:t>
+            </a:r>
+            <a:r>
               <a:rPr lang="en-US" sz="1200" dirty="0">
                 <a:effectLst/>
               </a:rPr>
-              <a:t>U.S. Census Bureau. (2020). Profile of General Population and Housing Characteristics. United States Census Bureau [Table DP1]. Retrieved from </a:t>
-            </a:r>
-            <a:r>
-              <a:rPr lang="en-US" sz="1200" u="sng" dirty="0">
-                <a:solidFill>
-                  <a:srgbClr val="DCA10D"/>
-                </a:solidFill>
+              <a:t>. (2010): </a:t>
+            </a:r>
+            <a:r>
+              <a:rPr lang="en-US" sz="1200" dirty="0">
                 <a:effectLst/>
                 <a:hlinkClick r:id="rId6"/>
               </a:rPr>
-              <a:t>https://data.census.gov/table/DECENNIALDP2020.DP1?g=040XX00US53,53$1400000&amp;d=DEC%20Demographic%20Profile</a:t>
-            </a:r>
-            <a:r>
-              <a:rPr lang="en-US" sz="1200" dirty="0">
-                <a:effectLst/>
-              </a:rPr>
-              <a:t>.</a:t>
-            </a:r>
+              <a:t>https://ofm.wa.gov/washington-data-research/population-demographics/gis-data/census-geographic-files</a:t>
+            </a:r>
+            <a:endParaRPr lang="en-US" sz="1200" dirty="0">
+              <a:effectLst/>
+            </a:endParaRPr>
           </a:p>
           <a:p>
             <a:pPr>
@@ -5432,7 +5683,7 @@
               <a:rPr lang="en-US" sz="1200" dirty="0">
                 <a:effectLst/>
               </a:rPr>
-              <a:t>Washington State Department of Health (2023). Hospitals. Washington State Department of Health [Shapefile]. Retrieved from </a:t>
+              <a:t> Department of Health (2023). Hospitals. Washington State Department of Health [Shapefile]. Retrieved from </a:t>
             </a:r>
             <a:r>
               <a:rPr lang="en-US" sz="1200" u="sng" dirty="0">
@@ -5440,16 +5691,12 @@
                   <a:srgbClr val="DCA10D"/>
                 </a:solidFill>
                 <a:effectLst/>
-                <a:hlinkClick r:id="rId7"/>
               </a:rPr>
-              <a:t>https://doh.wa.gov/data-statistical-reports/data-systems/geographic-information-system/downloadable-data-sets</a:t>
-            </a:r>
-            <a:r>
-              <a:rPr lang="en-US" sz="1200" dirty="0">
-                <a:effectLst/>
-              </a:rPr>
-              <a:t>.</a:t>
-            </a:r>
+              <a:t>https://data-f2977-wa-geoservices.opendata.arcgis.com/datasets/626cb2ca35c64ea1a2ac502c573e3ec9/explore?showTable=true </a:t>
+            </a:r>
+            <a:endParaRPr lang="en-US" sz="1200" dirty="0">
+              <a:effectLst/>
+            </a:endParaRPr>
           </a:p>
         </p:txBody>
       </p:sp>
@@ -5499,40 +5746,79 @@
             <p:ph type="title"/>
           </p:nvPr>
         </p:nvSpPr>
+        <p:spPr>
+          <a:xfrm>
+            <a:off x="458694" y="132495"/>
+            <a:ext cx="10895106" cy="1325563"/>
+          </a:xfrm>
+        </p:spPr>
+        <p:txBody>
+          <a:bodyPr/>
+          <a:lstStyle/>
+          <a:p>
+            <a:r>
+              <a:rPr lang="en-US" altLang="zh-CN" dirty="0"/>
+              <a:t>County Population</a:t>
+            </a:r>
+            <a:endParaRPr lang="en-US" dirty="0"/>
+          </a:p>
+        </p:txBody>
+      </p:sp>
+      <p:sp>
+        <p:nvSpPr>
+          <p:cNvPr id="3" name="Content Placeholder 2">
+            <a:extLst>
+              <a:ext uri="{FF2B5EF4-FFF2-40B4-BE49-F238E27FC236}">
+                <a16:creationId xmlns:a16="http://schemas.microsoft.com/office/drawing/2014/main" id="{43220310-D4AC-90DC-817F-AF4158140882}"/>
+              </a:ext>
+            </a:extLst>
+          </p:cNvPr>
+          <p:cNvSpPr>
+            <a:spLocks noGrp="1"/>
+          </p:cNvSpPr>
+          <p:nvPr>
+            <p:ph idx="1"/>
+          </p:nvPr>
+        </p:nvSpPr>
         <p:spPr/>
         <p:txBody>
           <a:bodyPr/>
           <a:lstStyle/>
           <a:p>
-            <a:endParaRPr lang="en-US"/>
-          </a:p>
-        </p:txBody>
-      </p:sp>
-      <p:sp>
-        <p:nvSpPr>
-          <p:cNvPr id="3" name="Content Placeholder 2">
-            <a:extLst>
-              <a:ext uri="{FF2B5EF4-FFF2-40B4-BE49-F238E27FC236}">
-                <a16:creationId xmlns:a16="http://schemas.microsoft.com/office/drawing/2014/main" id="{43220310-D4AC-90DC-817F-AF4158140882}"/>
-              </a:ext>
-            </a:extLst>
-          </p:cNvPr>
-          <p:cNvSpPr>
-            <a:spLocks noGrp="1"/>
-          </p:cNvSpPr>
-          <p:nvPr>
-            <p:ph idx="1"/>
-          </p:nvPr>
-        </p:nvSpPr>
-        <p:spPr/>
-        <p:txBody>
-          <a:bodyPr/>
-          <a:lstStyle/>
-          <a:p>
-            <a:endParaRPr lang="en-US"/>
-          </a:p>
-        </p:txBody>
-      </p:sp>
+            <a:endParaRPr lang="en-US" dirty="0"/>
+          </a:p>
+        </p:txBody>
+      </p:sp>
+      <p:pic>
+        <p:nvPicPr>
+          <p:cNvPr id="7" name="图片 6">
+            <a:extLst>
+              <a:ext uri="{FF2B5EF4-FFF2-40B4-BE49-F238E27FC236}">
+                <a16:creationId xmlns:a16="http://schemas.microsoft.com/office/drawing/2014/main" id="{7055E5F9-F8D9-16B2-3E27-DA63354B65F0}"/>
+              </a:ext>
+            </a:extLst>
+          </p:cNvPr>
+          <p:cNvPicPr>
+            <a:picLocks noChangeAspect="1"/>
+          </p:cNvPicPr>
+          <p:nvPr/>
+        </p:nvPicPr>
+        <p:blipFill>
+          <a:blip r:embed="rId2"/>
+          <a:stretch>
+            <a:fillRect/>
+          </a:stretch>
+        </p:blipFill>
+        <p:spPr>
+          <a:xfrm>
+            <a:off x="391886" y="1280468"/>
+            <a:ext cx="10427736" cy="6238816"/>
+          </a:xfrm>
+          <a:prstGeom prst="rect">
+            <a:avLst/>
+          </a:prstGeom>
+        </p:spPr>
+      </p:pic>
     </p:spTree>
     <p:extLst>
       <p:ext uri="{BB962C8B-B14F-4D97-AF65-F5344CB8AC3E}">

</xml_diff>